<commit_message>
Removed my speaker notes
</commit_message>
<xml_diff>
--- a/Matt Hitchcock/The Release Pipeline in Practice/The Release Pipeline in Practice.pptx
+++ b/Matt Hitchcock/The Release Pipeline in Practice/The Release Pipeline in Practice.pptx
@@ -1281,526 +1281,6 @@
           <a:bodyPr/>
           <a:lstStyle/>
           <a:p>
-            <a:r>
-              <a:rPr lang="en-SG" dirty="0"/>
-              <a:t>Now we are going to do some demo. What I want to do here is go through the motions of how we would manage this environment as-code, this is for the folks who are not yet doing this but who think they want to. And my intention here is to give you a feel for what the daily cycle is like and a feel for how our job changes when we actually start doing this. Don’t worry about understanding how everything works, just watch what I do.</a:t>
-            </a:r>
-          </a:p>
-          <a:p>
-            <a:endParaRPr lang="en-SG" dirty="0"/>
-          </a:p>
-          <a:p>
-            <a:r>
-              <a:rPr lang="en-SG" dirty="0"/>
-              <a:t>It’s a simple demo, we are basically going to:</a:t>
-            </a:r>
-          </a:p>
-          <a:p>
-            <a:pPr marL="228600" indent="-228600">
-              <a:buFont typeface="+mj-lt"/>
-              <a:buAutoNum type="arabicPeriod"/>
-            </a:pPr>
-            <a:r>
-              <a:rPr lang="en-SG" dirty="0"/>
-              <a:t>Make a configuration change – add a hotfix to our Web Farm</a:t>
-            </a:r>
-          </a:p>
-          <a:p>
-            <a:pPr marL="228600" indent="-228600">
-              <a:buFont typeface="+mj-lt"/>
-              <a:buAutoNum type="arabicPeriod"/>
-            </a:pPr>
-            <a:r>
-              <a:rPr lang="en-SG" dirty="0"/>
-              <a:t>Add an additional Node</a:t>
-            </a:r>
-          </a:p>
-          <a:p>
-            <a:pPr marL="0" indent="0">
-              <a:buFont typeface="+mj-lt"/>
-              <a:buNone/>
-            </a:pPr>
-            <a:endParaRPr lang="en-SG" dirty="0"/>
-          </a:p>
-          <a:p>
-            <a:pPr marL="0" indent="0">
-              <a:buFont typeface="+mj-lt"/>
-              <a:buNone/>
-            </a:pPr>
-            <a:endParaRPr lang="en-SG" dirty="0"/>
-          </a:p>
-          <a:p>
-            <a:pPr marL="0" indent="0">
-              <a:buFont typeface="+mj-lt"/>
-              <a:buNone/>
-            </a:pPr>
-            <a:r>
-              <a:rPr lang="en-SG" dirty="0"/>
-              <a:t>Steps</a:t>
-            </a:r>
-          </a:p>
-          <a:p>
-            <a:pPr marL="171450" indent="-171450">
-              <a:buFont typeface="Arial" panose="020B0604020202020204" pitchFamily="34" charset="0"/>
-              <a:buChar char="•"/>
-            </a:pPr>
-            <a:r>
-              <a:rPr lang="en-SG" dirty="0"/>
-              <a:t>Overview of my set up</a:t>
-            </a:r>
-          </a:p>
-          <a:p>
-            <a:pPr marL="628650" lvl="1" indent="-171450">
-              <a:buFont typeface="Arial" panose="020B0604020202020204" pitchFamily="34" charset="0"/>
-              <a:buChar char="•"/>
-            </a:pPr>
-            <a:r>
-              <a:rPr lang="en-SG" dirty="0"/>
-              <a:t>Detail notes here </a:t>
-            </a:r>
-          </a:p>
-          <a:p>
-            <a:pPr marL="171450" lvl="0" indent="-171450">
-              <a:buFont typeface="Arial" panose="020B0604020202020204" pitchFamily="34" charset="0"/>
-              <a:buChar char="•"/>
-            </a:pPr>
-            <a:r>
-              <a:rPr lang="en-SG" dirty="0"/>
-              <a:t>Log into the Dev Workstation and open TFS Portal</a:t>
-            </a:r>
-          </a:p>
-          <a:p>
-            <a:pPr marL="171450" lvl="0" indent="-171450">
-              <a:buFont typeface="Arial" panose="020B0604020202020204" pitchFamily="34" charset="0"/>
-              <a:buChar char="•"/>
-            </a:pPr>
-            <a:r>
-              <a:rPr lang="en-SG" dirty="0"/>
-              <a:t>Manage my Work Items – Create a Branch for my work – point out that there are many strategies for Branching and Merging, pick what works for you</a:t>
-            </a:r>
-          </a:p>
-          <a:p>
-            <a:pPr marL="171450" lvl="0" indent="-171450">
-              <a:buFont typeface="Arial" panose="020B0604020202020204" pitchFamily="34" charset="0"/>
-              <a:buChar char="•"/>
-            </a:pPr>
-            <a:r>
-              <a:rPr lang="en-SG" dirty="0"/>
-              <a:t>Clone the repo</a:t>
-            </a:r>
-          </a:p>
-          <a:p>
-            <a:pPr marL="171450" lvl="0" indent="-171450">
-              <a:buFont typeface="Arial" panose="020B0604020202020204" pitchFamily="34" charset="0"/>
-              <a:buChar char="•"/>
-            </a:pPr>
-            <a:r>
-              <a:rPr lang="en-SG" dirty="0"/>
-              <a:t>Add code</a:t>
-            </a:r>
-          </a:p>
-          <a:p>
-            <a:pPr marL="628650" lvl="1" indent="-171450">
-              <a:buFont typeface="Arial" panose="020B0604020202020204" pitchFamily="34" charset="0"/>
-              <a:buChar char="•"/>
-            </a:pPr>
-            <a:r>
-              <a:rPr lang="en-SG" dirty="0"/>
-              <a:t>Ensure Hotfix is not present</a:t>
-            </a:r>
-          </a:p>
-          <a:p>
-            <a:pPr marL="628650" lvl="1" indent="-171450">
-              <a:buFont typeface="Arial" panose="020B0604020202020204" pitchFamily="34" charset="0"/>
-              <a:buChar char="•"/>
-            </a:pPr>
-            <a:r>
-              <a:rPr lang="en-SG" dirty="0"/>
-              <a:t>Unit Test</a:t>
-            </a:r>
-          </a:p>
-          <a:p>
-            <a:pPr marL="628650" lvl="1" indent="-171450">
-              <a:buFont typeface="Arial" panose="020B0604020202020204" pitchFamily="34" charset="0"/>
-              <a:buChar char="•"/>
-            </a:pPr>
-            <a:r>
-              <a:rPr lang="en-SG" dirty="0"/>
-              <a:t>Integration test</a:t>
-            </a:r>
-          </a:p>
-          <a:p>
-            <a:pPr marL="628650" lvl="1" indent="-171450">
-              <a:buFont typeface="Arial" panose="020B0604020202020204" pitchFamily="34" charset="0"/>
-              <a:buChar char="•"/>
-            </a:pPr>
-            <a:r>
-              <a:rPr lang="en-SG" dirty="0"/>
-              <a:t>Acceptance Test</a:t>
-            </a:r>
-          </a:p>
-          <a:p>
-            <a:pPr marL="171450" lvl="0" indent="-171450">
-              <a:buFont typeface="Arial" panose="020B0604020202020204" pitchFamily="34" charset="0"/>
-              <a:buChar char="•"/>
-            </a:pPr>
-            <a:r>
-              <a:rPr lang="en-SG" dirty="0"/>
-              <a:t>Commit &amp; Push</a:t>
-            </a:r>
-          </a:p>
-          <a:p>
-            <a:pPr marL="171450" lvl="0" indent="-171450">
-              <a:buFont typeface="Arial" panose="020B0604020202020204" pitchFamily="34" charset="0"/>
-              <a:buChar char="•"/>
-            </a:pPr>
-            <a:r>
-              <a:rPr lang="en-SG" dirty="0"/>
-              <a:t>Build</a:t>
-            </a:r>
-          </a:p>
-          <a:p>
-            <a:pPr marL="171450" lvl="0" indent="-171450">
-              <a:buFont typeface="Arial" panose="020B0604020202020204" pitchFamily="34" charset="0"/>
-              <a:buChar char="•"/>
-            </a:pPr>
-            <a:r>
-              <a:rPr lang="en-SG" dirty="0"/>
-              <a:t>Release</a:t>
-            </a:r>
-          </a:p>
-          <a:p>
-            <a:pPr marL="171450" lvl="0" indent="-171450">
-              <a:buFont typeface="Arial" panose="020B0604020202020204" pitchFamily="34" charset="0"/>
-              <a:buChar char="•"/>
-            </a:pPr>
-            <a:r>
-              <a:rPr lang="en-SG" dirty="0"/>
-              <a:t>Pull Request</a:t>
-            </a:r>
-          </a:p>
-          <a:p>
-            <a:pPr marL="171450" lvl="0" indent="-171450">
-              <a:buFont typeface="Arial" panose="020B0604020202020204" pitchFamily="34" charset="0"/>
-              <a:buChar char="•"/>
-            </a:pPr>
-            <a:r>
-              <a:rPr lang="en-SG" dirty="0"/>
-              <a:t>Delete Branch</a:t>
-            </a:r>
-          </a:p>
-          <a:p>
-            <a:pPr marL="171450" lvl="0" indent="-171450">
-              <a:buFont typeface="Arial" panose="020B0604020202020204" pitchFamily="34" charset="0"/>
-              <a:buChar char="•"/>
-            </a:pPr>
-            <a:r>
-              <a:rPr lang="en-SG" dirty="0"/>
-              <a:t>Manage my work items – pick next card to add a hotfix</a:t>
-            </a:r>
-          </a:p>
-          <a:p>
-            <a:pPr marL="171450" lvl="0" indent="-171450">
-              <a:buFont typeface="Arial" panose="020B0604020202020204" pitchFamily="34" charset="0"/>
-              <a:buChar char="•"/>
-            </a:pPr>
-            <a:r>
-              <a:rPr lang="en-SG" dirty="0"/>
-              <a:t>Create a branch</a:t>
-            </a:r>
-          </a:p>
-          <a:p>
-            <a:pPr marL="171450" lvl="0" indent="-171450">
-              <a:buFont typeface="Arial" panose="020B0604020202020204" pitchFamily="34" charset="0"/>
-              <a:buChar char="•"/>
-            </a:pPr>
-            <a:r>
-              <a:rPr lang="en-SG" dirty="0"/>
-              <a:t>Clone the repo</a:t>
-            </a:r>
-          </a:p>
-          <a:p>
-            <a:pPr marL="171450" lvl="0" indent="-171450">
-              <a:buFont typeface="Arial" panose="020B0604020202020204" pitchFamily="34" charset="0"/>
-              <a:buChar char="•"/>
-            </a:pPr>
-            <a:r>
-              <a:rPr lang="en-SG" dirty="0"/>
-              <a:t>Add code</a:t>
-            </a:r>
-          </a:p>
-          <a:p>
-            <a:pPr marL="628650" lvl="1" indent="-171450">
-              <a:buFont typeface="Arial" panose="020B0604020202020204" pitchFamily="34" charset="0"/>
-              <a:buChar char="•"/>
-            </a:pPr>
-            <a:r>
-              <a:rPr lang="en-SG" dirty="0"/>
-              <a:t>Ensure Hotfix is present</a:t>
-            </a:r>
-          </a:p>
-          <a:p>
-            <a:pPr marL="628650" lvl="1" indent="-171450">
-              <a:buFont typeface="Arial" panose="020B0604020202020204" pitchFamily="34" charset="0"/>
-              <a:buChar char="•"/>
-            </a:pPr>
-            <a:r>
-              <a:rPr lang="en-SG" dirty="0"/>
-              <a:t>Unit Test</a:t>
-            </a:r>
-          </a:p>
-          <a:p>
-            <a:pPr marL="628650" lvl="1" indent="-171450">
-              <a:buFont typeface="Arial" panose="020B0604020202020204" pitchFamily="34" charset="0"/>
-              <a:buChar char="•"/>
-            </a:pPr>
-            <a:r>
-              <a:rPr lang="en-SG" dirty="0"/>
-              <a:t>Integration test</a:t>
-            </a:r>
-          </a:p>
-          <a:p>
-            <a:pPr marL="628650" lvl="1" indent="-171450">
-              <a:buFont typeface="Arial" panose="020B0604020202020204" pitchFamily="34" charset="0"/>
-              <a:buChar char="•"/>
-            </a:pPr>
-            <a:r>
-              <a:rPr lang="en-SG" dirty="0"/>
-              <a:t>Acceptance Test</a:t>
-            </a:r>
-          </a:p>
-          <a:p>
-            <a:pPr marL="171450" lvl="0" indent="-171450">
-              <a:buFont typeface="Arial" panose="020B0604020202020204" pitchFamily="34" charset="0"/>
-              <a:buChar char="•"/>
-            </a:pPr>
-            <a:r>
-              <a:rPr lang="en-SG" dirty="0"/>
-              <a:t>Commit &amp; Push</a:t>
-            </a:r>
-          </a:p>
-          <a:p>
-            <a:pPr marL="171450" lvl="0" indent="-171450">
-              <a:buFont typeface="Arial" panose="020B0604020202020204" pitchFamily="34" charset="0"/>
-              <a:buChar char="•"/>
-            </a:pPr>
-            <a:r>
-              <a:rPr lang="en-SG" dirty="0"/>
-              <a:t>Build</a:t>
-            </a:r>
-          </a:p>
-          <a:p>
-            <a:pPr marL="171450" lvl="0" indent="-171450">
-              <a:buFont typeface="Arial" panose="020B0604020202020204" pitchFamily="34" charset="0"/>
-              <a:buChar char="•"/>
-            </a:pPr>
-            <a:r>
-              <a:rPr lang="en-SG" dirty="0"/>
-              <a:t>Release</a:t>
-            </a:r>
-          </a:p>
-          <a:p>
-            <a:pPr marL="171450" lvl="0" indent="-171450">
-              <a:buFont typeface="Arial" panose="020B0604020202020204" pitchFamily="34" charset="0"/>
-              <a:buChar char="•"/>
-            </a:pPr>
-            <a:r>
-              <a:rPr lang="en-SG" dirty="0"/>
-              <a:t>Pull Request</a:t>
-            </a:r>
-          </a:p>
-          <a:p>
-            <a:pPr marL="171450" lvl="0" indent="-171450">
-              <a:buFont typeface="Arial" panose="020B0604020202020204" pitchFamily="34" charset="0"/>
-              <a:buChar char="•"/>
-            </a:pPr>
-            <a:r>
-              <a:rPr lang="en-SG" dirty="0"/>
-              <a:t>Delete Branch</a:t>
-            </a:r>
-          </a:p>
-          <a:p>
-            <a:pPr marL="171450" lvl="0" indent="-171450">
-              <a:buFont typeface="Arial" panose="020B0604020202020204" pitchFamily="34" charset="0"/>
-              <a:buChar char="•"/>
-            </a:pPr>
-            <a:r>
-              <a:rPr lang="en-SG" dirty="0"/>
-              <a:t>Close the work item</a:t>
-            </a:r>
-          </a:p>
-          <a:p>
-            <a:pPr marL="171450" lvl="0" indent="-171450">
-              <a:buFont typeface="Arial" panose="020B0604020202020204" pitchFamily="34" charset="0"/>
-              <a:buChar char="•"/>
-            </a:pPr>
-            <a:r>
-              <a:rPr lang="en-SG" dirty="0"/>
-              <a:t>Manage my work items – pick next card to add a Node</a:t>
-            </a:r>
-          </a:p>
-          <a:p>
-            <a:pPr marL="171450" lvl="0" indent="-171450">
-              <a:buFont typeface="Arial" panose="020B0604020202020204" pitchFamily="34" charset="0"/>
-              <a:buChar char="•"/>
-            </a:pPr>
-            <a:r>
-              <a:rPr lang="en-SG" dirty="0"/>
-              <a:t>Create a branch</a:t>
-            </a:r>
-          </a:p>
-          <a:p>
-            <a:pPr marL="171450" lvl="0" indent="-171450">
-              <a:buFont typeface="Arial" panose="020B0604020202020204" pitchFamily="34" charset="0"/>
-              <a:buChar char="•"/>
-            </a:pPr>
-            <a:r>
-              <a:rPr lang="en-SG" dirty="0"/>
-              <a:t>Clone the repo</a:t>
-            </a:r>
-          </a:p>
-          <a:p>
-            <a:pPr marL="171450" lvl="0" indent="-171450">
-              <a:buFont typeface="Arial" panose="020B0604020202020204" pitchFamily="34" charset="0"/>
-              <a:buChar char="•"/>
-            </a:pPr>
-            <a:r>
-              <a:rPr lang="en-SG" dirty="0"/>
-              <a:t>Add code</a:t>
-            </a:r>
-          </a:p>
-          <a:p>
-            <a:pPr marL="628650" lvl="1" indent="-171450">
-              <a:buFont typeface="Arial" panose="020B0604020202020204" pitchFamily="34" charset="0"/>
-              <a:buChar char="•"/>
-            </a:pPr>
-            <a:r>
-              <a:rPr lang="en-SG" dirty="0"/>
-              <a:t>Ensure Hotfix is present</a:t>
-            </a:r>
-          </a:p>
-          <a:p>
-            <a:pPr marL="628650" lvl="1" indent="-171450">
-              <a:buFont typeface="Arial" panose="020B0604020202020204" pitchFamily="34" charset="0"/>
-              <a:buChar char="•"/>
-            </a:pPr>
-            <a:r>
-              <a:rPr lang="en-SG" dirty="0"/>
-              <a:t>Unit Test</a:t>
-            </a:r>
-          </a:p>
-          <a:p>
-            <a:pPr marL="628650" lvl="1" indent="-171450">
-              <a:buFont typeface="Arial" panose="020B0604020202020204" pitchFamily="34" charset="0"/>
-              <a:buChar char="•"/>
-            </a:pPr>
-            <a:r>
-              <a:rPr lang="en-SG" dirty="0"/>
-              <a:t>Integration test</a:t>
-            </a:r>
-          </a:p>
-          <a:p>
-            <a:pPr marL="628650" lvl="1" indent="-171450">
-              <a:buFont typeface="Arial" panose="020B0604020202020204" pitchFamily="34" charset="0"/>
-              <a:buChar char="•"/>
-            </a:pPr>
-            <a:r>
-              <a:rPr lang="en-SG" dirty="0"/>
-              <a:t>Acceptance Test</a:t>
-            </a:r>
-          </a:p>
-          <a:p>
-            <a:pPr marL="171450" lvl="0" indent="-171450">
-              <a:buFont typeface="Arial" panose="020B0604020202020204" pitchFamily="34" charset="0"/>
-              <a:buChar char="•"/>
-            </a:pPr>
-            <a:r>
-              <a:rPr lang="en-SG" dirty="0"/>
-              <a:t>Commit &amp; Push</a:t>
-            </a:r>
-          </a:p>
-          <a:p>
-            <a:pPr marL="171450" lvl="0" indent="-171450">
-              <a:buFont typeface="Arial" panose="020B0604020202020204" pitchFamily="34" charset="0"/>
-              <a:buChar char="•"/>
-            </a:pPr>
-            <a:r>
-              <a:rPr lang="en-SG" dirty="0"/>
-              <a:t>Build</a:t>
-            </a:r>
-          </a:p>
-          <a:p>
-            <a:pPr marL="171450" lvl="0" indent="-171450">
-              <a:buFont typeface="Arial" panose="020B0604020202020204" pitchFamily="34" charset="0"/>
-              <a:buChar char="•"/>
-            </a:pPr>
-            <a:r>
-              <a:rPr lang="en-SG" dirty="0"/>
-              <a:t>Release</a:t>
-            </a:r>
-          </a:p>
-          <a:p>
-            <a:pPr marL="171450" lvl="0" indent="-171450">
-              <a:buFont typeface="Arial" panose="020B0604020202020204" pitchFamily="34" charset="0"/>
-              <a:buChar char="•"/>
-            </a:pPr>
-            <a:r>
-              <a:rPr lang="en-SG" dirty="0"/>
-              <a:t>Pull Request</a:t>
-            </a:r>
-          </a:p>
-          <a:p>
-            <a:pPr marL="171450" lvl="0" indent="-171450">
-              <a:buFont typeface="Arial" panose="020B0604020202020204" pitchFamily="34" charset="0"/>
-              <a:buChar char="•"/>
-            </a:pPr>
-            <a:r>
-              <a:rPr lang="en-SG" dirty="0"/>
-              <a:t>Delete Branch</a:t>
-            </a:r>
-          </a:p>
-          <a:p>
-            <a:pPr marL="171450" lvl="0" indent="-171450">
-              <a:buFont typeface="Arial" panose="020B0604020202020204" pitchFamily="34" charset="0"/>
-              <a:buChar char="•"/>
-            </a:pPr>
-            <a:r>
-              <a:rPr lang="en-SG" dirty="0"/>
-              <a:t>Close the work item</a:t>
-            </a:r>
-          </a:p>
-          <a:p>
-            <a:pPr marL="171450" lvl="0" indent="-171450">
-              <a:buFont typeface="Arial" panose="020B0604020202020204" pitchFamily="34" charset="0"/>
-              <a:buChar char="•"/>
-            </a:pPr>
-            <a:endParaRPr lang="en-SG" dirty="0"/>
-          </a:p>
-          <a:p>
-            <a:pPr marL="171450" lvl="0" indent="-171450">
-              <a:buFont typeface="Arial" panose="020B0604020202020204" pitchFamily="34" charset="0"/>
-              <a:buChar char="•"/>
-            </a:pPr>
-            <a:endParaRPr lang="en-SG" dirty="0"/>
-          </a:p>
-          <a:p>
-            <a:pPr marL="171450" lvl="0" indent="-171450">
-              <a:buFont typeface="Arial" panose="020B0604020202020204" pitchFamily="34" charset="0"/>
-              <a:buChar char="•"/>
-            </a:pPr>
-            <a:r>
-              <a:rPr lang="en-SG" dirty="0"/>
-              <a:t>Explain that there are many ways in which to do Master merge flow, GitFlow for example, choose your own based on what’s right for you and your comfort level.</a:t>
-            </a:r>
-          </a:p>
-          <a:p>
-            <a:pPr marL="171450" lvl="0" indent="-171450">
-              <a:buFont typeface="Arial" panose="020B0604020202020204" pitchFamily="34" charset="0"/>
-              <a:buChar char="•"/>
-            </a:pPr>
-            <a:endParaRPr lang="en-SG" dirty="0"/>
-          </a:p>
-          <a:p>
             <a:pPr marL="171450" lvl="0" indent="-171450">
               <a:buFont typeface="Arial" panose="020B0604020202020204" pitchFamily="34" charset="0"/>
               <a:buChar char="•"/>
@@ -1985,139 +1465,6 @@
           <a:bodyPr/>
           <a:lstStyle/>
           <a:p>
-            <a:r>
-              <a:rPr lang="en-SG" dirty="0"/>
-              <a:t>So that is how the team I am working with are now starting to work, that’s the new Normal. This is a big change to how they have always worked and it has taken a lot of time to get to where we are. Challenges include:</a:t>
-            </a:r>
-          </a:p>
-          <a:p>
-            <a:endParaRPr lang="en-SG" dirty="0"/>
-          </a:p>
-          <a:p>
-            <a:r>
-              <a:rPr lang="en-SG" dirty="0"/>
-              <a:t>Technical</a:t>
-            </a:r>
-          </a:p>
-          <a:p>
-            <a:pPr lvl="1"/>
-            <a:r>
-              <a:rPr lang="en-SG" dirty="0"/>
-              <a:t>Filling in the gaps</a:t>
-            </a:r>
-          </a:p>
-          <a:p>
-            <a:pPr lvl="1"/>
-            <a:r>
-              <a:rPr lang="en-SG" dirty="0"/>
-              <a:t>	Credential Management</a:t>
-            </a:r>
-          </a:p>
-          <a:p>
-            <a:pPr lvl="1"/>
-            <a:r>
-              <a:rPr lang="en-SG" dirty="0"/>
-              <a:t>	Release Orchestration</a:t>
-            </a:r>
-          </a:p>
-          <a:p>
-            <a:pPr lvl="1"/>
-            <a:r>
-              <a:rPr lang="en-SG" dirty="0"/>
-              <a:t>	Environment issues</a:t>
-            </a:r>
-          </a:p>
-          <a:p>
-            <a:pPr lvl="1"/>
-            <a:r>
-              <a:rPr lang="en-SG" dirty="0"/>
-              <a:t>	Missing DSC Resources</a:t>
-            </a:r>
-          </a:p>
-          <a:p>
-            <a:pPr lvl="1"/>
-            <a:r>
-              <a:rPr lang="en-SG" dirty="0"/>
-              <a:t>		Use of Script Resource a lot</a:t>
-            </a:r>
-          </a:p>
-          <a:p>
-            <a:pPr marL="0" marR="0" lvl="0" indent="0" algn="l" defTabSz="914400" rtl="0" eaLnBrk="0" fontAlgn="base" latinLnBrk="0" hangingPunct="0">
-              <a:lnSpc>
-                <a:spcPct val="100000"/>
-              </a:lnSpc>
-              <a:spcBef>
-                <a:spcPct val="30000"/>
-              </a:spcBef>
-              <a:spcAft>
-                <a:spcPct val="0"/>
-              </a:spcAft>
-              <a:buClrTx/>
-              <a:buSzTx/>
-              <a:buFontTx/>
-              <a:buNone/>
-              <a:tabLst/>
-              <a:defRPr/>
-            </a:pPr>
-            <a:r>
-              <a:rPr lang="en-SG" dirty="0"/>
-              <a:t>	Locked down desktop environment – to any real developers out there, I am so sorry!</a:t>
-            </a:r>
-          </a:p>
-          <a:p>
-            <a:endParaRPr lang="en-SG" dirty="0"/>
-          </a:p>
-          <a:p>
-            <a:endParaRPr lang="en-SG" dirty="0"/>
-          </a:p>
-          <a:p>
-            <a:r>
-              <a:rPr lang="en-SG" dirty="0"/>
-              <a:t>People</a:t>
-            </a:r>
-          </a:p>
-          <a:p>
-            <a:pPr lvl="1"/>
-            <a:r>
-              <a:rPr lang="en-SG" dirty="0"/>
-              <a:t>Prioritisation</a:t>
-            </a:r>
-          </a:p>
-          <a:p>
-            <a:pPr lvl="1"/>
-            <a:r>
-              <a:rPr lang="en-SG" dirty="0"/>
-              <a:t>Silent </a:t>
-            </a:r>
-            <a:r>
-              <a:rPr lang="en-SG" dirty="0" err="1"/>
-              <a:t>Resistence</a:t>
-            </a:r>
-            <a:r>
-              <a:rPr lang="en-SG" dirty="0"/>
-              <a:t> – Not everyone is bought into this. They will say “yes” then become blockers by finding other things to fill their time with</a:t>
-            </a:r>
-          </a:p>
-          <a:p>
-            <a:pPr lvl="1"/>
-            <a:r>
-              <a:rPr lang="en-SG" dirty="0"/>
-              <a:t>Skills development</a:t>
-            </a:r>
-          </a:p>
-          <a:p>
-            <a:pPr lvl="1"/>
-            <a:r>
-              <a:rPr lang="en-SG" dirty="0"/>
-              <a:t>Comfort Zone</a:t>
-            </a:r>
-          </a:p>
-          <a:p>
-            <a:pPr lvl="1"/>
-            <a:r>
-              <a:rPr lang="en-SG" dirty="0"/>
-              <a:t>Changing how we think about infra</a:t>
-            </a:r>
             <a:endParaRPr lang="en-US" dirty="0"/>
           </a:p>
         </p:txBody>
@@ -2208,43 +1555,7 @@
           <a:bodyPr/>
           <a:lstStyle/>
           <a:p>
-            <a:r>
-              <a:rPr lang="en-US" dirty="0"/>
-              <a:t>Here is a quick outline of how the timeline has gone for us.</a:t>
-            </a:r>
-          </a:p>
-          <a:p>
-            <a:r>
-              <a:rPr lang="en-US" dirty="0"/>
-              <a:t>As you can see we are 10 months in and arguably we are quite immature.</a:t>
-            </a:r>
-          </a:p>
-          <a:p>
-            <a:r>
-              <a:rPr lang="en-US" dirty="0"/>
-              <a:t>Donovan Brown will be up here telling you how you can get a DevOps pipeline running in an hour, but when you’re working with Ops folks who are just not used to this its slightly different.</a:t>
-            </a:r>
-          </a:p>
-          <a:p>
-            <a:r>
-              <a:rPr lang="en-US" dirty="0"/>
-              <a:t>Some teams are different, they just run at it, but most teams have other priorities and they have to balance this stuff</a:t>
-            </a:r>
-          </a:p>
-          <a:p>
-            <a:r>
-              <a:rPr lang="en-US" dirty="0"/>
-              <a:t>Not everyone learns so quickly either and as we said, some people just aren’t ready to change yet.</a:t>
-            </a:r>
-          </a:p>
-          <a:p>
             <a:endParaRPr lang="en-US" dirty="0"/>
-          </a:p>
-          <a:p>
-            <a:r>
-              <a:rPr lang="en-US" dirty="0"/>
-              <a:t>The moral of this slide is, if you’re doing this and its taking time, don’t worry about it too much, it seems its normal. You’re on the right path, just keep pushing on and count the small wins!</a:t>
-            </a:r>
           </a:p>
         </p:txBody>
       </p:sp>
@@ -3054,46 +2365,7 @@
           <a:bodyPr/>
           <a:lstStyle/>
           <a:p>
-            <a:r>
-              <a:rPr lang="en-SG" dirty="0"/>
-              <a:t>I am a Consultant at Microsoft. Right now, I am working with a customer, a bank, to start getting their Windows platform onto an infra-as-code approach.</a:t>
-            </a:r>
-          </a:p>
-          <a:p>
             <a:endParaRPr lang="en-SG" dirty="0"/>
-          </a:p>
-          <a:p>
-            <a:r>
-              <a:rPr lang="en-SG" dirty="0"/>
-              <a:t>The driver for this is based on some stability issues with Hyper-V which underpins their Private Cloud. There have been incidents in the past that have caused disruption and have been the result of incorrectly implemented changes that perhaps were not sufficiently tested.</a:t>
-            </a:r>
-          </a:p>
-          <a:p>
-            <a:endParaRPr lang="en-SG" dirty="0"/>
-          </a:p>
-          <a:p>
-            <a:r>
-              <a:rPr lang="en-SG" dirty="0"/>
-              <a:t>This happened last July. Following the incident, I presented an approach for managing the platform as code. This included DSC &amp; Pester but was really immature and certainly was not a full Release Pipeline. There was a lot I didn’t know at the time.</a:t>
-            </a:r>
-          </a:p>
-          <a:p>
-            <a:endParaRPr lang="en-SG" dirty="0"/>
-          </a:p>
-          <a:p>
-            <a:r>
-              <a:rPr lang="en-SG" dirty="0"/>
-              <a:t>Then, I went to Don Jones DSC Bootcamp, Michael and Mark were there presenting their Demo CI which basically was a big ah-ha and lightbulb moment and allowed me to plug a lot of things together.</a:t>
-            </a:r>
-          </a:p>
-          <a:p>
-            <a:endParaRPr lang="en-SG" dirty="0"/>
-          </a:p>
-          <a:p>
-            <a:r>
-              <a:rPr lang="en-SG" dirty="0"/>
-              <a:t>This allowed me to basically create a visualisation of all the parts working together and I came up with something like this … [NEXT SLIDE]</a:t>
-            </a:r>
           </a:p>
         </p:txBody>
       </p:sp>
@@ -3183,43 +2455,7 @@
           <a:bodyPr/>
           <a:lstStyle/>
           <a:p>
-            <a:r>
-              <a:rPr lang="en-US" dirty="0"/>
-              <a:t>The organization wanted to start adopting Infra-as-Code/Configuration Management but didn’t know where to start</a:t>
-            </a:r>
-          </a:p>
-          <a:p>
-            <a:r>
-              <a:rPr lang="en-US" dirty="0"/>
-              <a:t>These resources made a great demo and starting point which I delivered and from there, the customer said “conceptually this looks great, but we don’t quite understand the big picture”</a:t>
-            </a:r>
-          </a:p>
-          <a:p>
             <a:endParaRPr lang="en-US" dirty="0"/>
-          </a:p>
-          <a:p>
-            <a:pPr marL="228600" indent="-228600">
-              <a:buAutoNum type="arabicPeriod"/>
-            </a:pPr>
-            <a:r>
-              <a:rPr lang="en-US" dirty="0"/>
-              <a:t>How will this change us, what is the skill involved? What do we need to know, what processes do we need to change? Etc. – we don’t really know how to answer this until we know in more detail how it works, so I had to put time into that</a:t>
-            </a:r>
-          </a:p>
-          <a:p>
-            <a:pPr marL="228600" indent="-228600">
-              <a:buAutoNum type="arabicPeriod"/>
-            </a:pPr>
-            <a:endParaRPr lang="en-US" dirty="0"/>
-          </a:p>
-          <a:p>
-            <a:pPr marL="228600" indent="-228600">
-              <a:buAutoNum type="arabicPeriod"/>
-            </a:pPr>
-            <a:r>
-              <a:rPr lang="en-US" dirty="0"/>
-              <a:t>What does an enterprise architecture for this thing look like on a Microsoft stack? The demo and white paper are cool but they only delivered the higher level thinking and the Lower level detail but not the middle level view.</a:t>
-            </a:r>
           </a:p>
         </p:txBody>
       </p:sp>
@@ -3309,28 +2545,7 @@
           <a:bodyPr/>
           <a:lstStyle/>
           <a:p>
-            <a:r>
-              <a:rPr lang="en-US" dirty="0"/>
-              <a:t>Still feels like something only the chosen few could do</a:t>
-            </a:r>
-          </a:p>
-          <a:p>
             <a:endParaRPr lang="en-US" dirty="0"/>
-          </a:p>
-          <a:p>
-            <a:r>
-              <a:rPr lang="en-US" dirty="0"/>
-              <a:t>So first, I began to tackle the architecture question – what would that look like? How do we manage artifacts? How do we write our Tests. How do we use our tests? What’s the workflow involved? How do we separate Environments and Data from Code? How do we identify what the team needs to learn?</a:t>
-            </a:r>
-          </a:p>
-          <a:p>
-            <a:endParaRPr lang="en-US" dirty="0"/>
-          </a:p>
-          <a:p>
-            <a:r>
-              <a:rPr lang="en-US" dirty="0"/>
-              <a:t>How do we actually do this? And I realized a lot of it was staring me in the face all along …</a:t>
-            </a:r>
           </a:p>
         </p:txBody>
       </p:sp>
@@ -3510,55 +2725,7 @@
           <a:bodyPr/>
           <a:lstStyle/>
           <a:p>
-            <a:r>
-              <a:rPr lang="en-SG" dirty="0"/>
-              <a:t>This diagram basically produced the ah-ha moment for my customer too. I had sold them on the approach with a lot of open questions about how it would be managed and how it would operate. Fortunately they trusted me and we were trying to find our way forward but piecing together the Demo CI with the different tools Microsoft have to deliver Configuration Management (on premises) allowed me to come up with this.</a:t>
-            </a:r>
-          </a:p>
-          <a:p>
             <a:endParaRPr lang="en-SG" dirty="0"/>
-          </a:p>
-          <a:p>
-            <a:r>
-              <a:rPr lang="en-SG" dirty="0"/>
-              <a:t>Diagram explanation. This is the missing piece for most people who are looking to do DSC Configuration Management.</a:t>
-            </a:r>
-          </a:p>
-          <a:p>
-            <a:endParaRPr lang="en-SG" dirty="0"/>
-          </a:p>
-          <a:p>
-            <a:r>
-              <a:rPr lang="en-SG" dirty="0"/>
-              <a:t>Release Pipelines tend to differ based on the Solution you’re delivering but this one shows a generic solution and the idea is to show all the pieces in play.</a:t>
-            </a:r>
-          </a:p>
-          <a:p>
-            <a:endParaRPr lang="en-SG" dirty="0"/>
-          </a:p>
-          <a:p>
-            <a:r>
-              <a:rPr lang="en-SG" dirty="0"/>
-              <a:t>So now we know what the Architecture looks like, how do we use it?</a:t>
-            </a:r>
-          </a:p>
-          <a:p>
-            <a:endParaRPr lang="en-SG" dirty="0"/>
-          </a:p>
-          <a:p>
-            <a:r>
-              <a:rPr lang="en-SG" dirty="0"/>
-              <a:t>LEADS TO DEMO</a:t>
-            </a:r>
-          </a:p>
-          <a:p>
-            <a:endParaRPr lang="en-SG" dirty="0"/>
-          </a:p>
-          <a:p>
-            <a:r>
-              <a:rPr lang="en-SG" dirty="0"/>
-              <a:t>Have Karate Kid photo’s that rotate to the Visio!</a:t>
-            </a:r>
           </a:p>
         </p:txBody>
       </p:sp>

</xml_diff>